<commit_message>
correct society diversity experiment
</commit_message>
<xml_diff>
--- a/Report/Figures/diversity_results.pptx
+++ b/Report/Figures/diversity_results.pptx
@@ -104,6 +104,11 @@
       </a:defRPr>
     </a:lvl9pPr>
   </p:defaultTextStyle>
+  <p:extLst>
+    <p:ext uri="{EFAFB233-063F-42B5-8137-9DF3F51BA10A}">
+      <p15:sldGuideLst xmlns:p15="http://schemas.microsoft.com/office/powerpoint/2012/main"/>
+    </p:ext>
+  </p:extLst>
 </p:presentation>
 </file>
 
@@ -3344,10 +3349,10 @@
       </p:grpSpPr>
       <p:pic>
         <p:nvPicPr>
-          <p:cNvPr id="3" name="Immagine 2">
-            <a:extLst>
-              <a:ext uri="{FF2B5EF4-FFF2-40B4-BE49-F238E27FC236}">
-                <a16:creationId xmlns:a16="http://schemas.microsoft.com/office/drawing/2014/main" id="{E74DFECD-E545-4547-9D04-E079103CFF6C}"/>
+          <p:cNvPr id="6" name="Immagine 5">
+            <a:extLst>
+              <a:ext uri="{FF2B5EF4-FFF2-40B4-BE49-F238E27FC236}">
+                <a16:creationId xmlns:a16="http://schemas.microsoft.com/office/drawing/2014/main" id="{A86EAF92-9787-4135-8F2F-97A2177694B0}"/>
               </a:ext>
             </a:extLst>
           </p:cNvPr>
@@ -3370,8 +3375,8 @@
         </p:blipFill>
         <p:spPr>
           <a:xfrm>
-            <a:off x="1130159" y="351944"/>
-            <a:ext cx="3256908" cy="2442681"/>
+            <a:off x="914472" y="521468"/>
+            <a:ext cx="3428141" cy="2571106"/>
           </a:xfrm>
           <a:prstGeom prst="rect">
             <a:avLst/>
@@ -3380,10 +3385,10 @@
       </p:pic>
       <p:pic>
         <p:nvPicPr>
-          <p:cNvPr id="5" name="Immagine 4">
-            <a:extLst>
-              <a:ext uri="{FF2B5EF4-FFF2-40B4-BE49-F238E27FC236}">
-                <a16:creationId xmlns:a16="http://schemas.microsoft.com/office/drawing/2014/main" id="{3C2FD33D-28D4-4265-AE25-ADE9A7990ECE}"/>
+          <p:cNvPr id="8" name="Immagine 7">
+            <a:extLst>
+              <a:ext uri="{FF2B5EF4-FFF2-40B4-BE49-F238E27FC236}">
+                <a16:creationId xmlns:a16="http://schemas.microsoft.com/office/drawing/2014/main" id="{EA0B83A0-85D3-4D7C-80D4-82FF9FFF76F3}"/>
               </a:ext>
             </a:extLst>
           </p:cNvPr>
@@ -3406,8 +3411,8 @@
         </p:blipFill>
         <p:spPr>
           <a:xfrm>
-            <a:off x="4387067" y="351944"/>
-            <a:ext cx="3256908" cy="2442681"/>
+            <a:off x="4342611" y="521468"/>
+            <a:ext cx="3428142" cy="2571106"/>
           </a:xfrm>
           <a:prstGeom prst="rect">
             <a:avLst/>
@@ -3416,10 +3421,10 @@
       </p:pic>
       <p:pic>
         <p:nvPicPr>
-          <p:cNvPr id="7" name="Immagine 6">
-            <a:extLst>
-              <a:ext uri="{FF2B5EF4-FFF2-40B4-BE49-F238E27FC236}">
-                <a16:creationId xmlns:a16="http://schemas.microsoft.com/office/drawing/2014/main" id="{53516336-9A3A-4C0D-BC6F-CA507FF17A01}"/>
+          <p:cNvPr id="10" name="Immagine 9">
+            <a:extLst>
+              <a:ext uri="{FF2B5EF4-FFF2-40B4-BE49-F238E27FC236}">
+                <a16:creationId xmlns:a16="http://schemas.microsoft.com/office/drawing/2014/main" id="{D0C87070-5636-407D-BF3A-40F8E3B8DEF3}"/>
               </a:ext>
             </a:extLst>
           </p:cNvPr>
@@ -3442,8 +3447,8 @@
         </p:blipFill>
         <p:spPr>
           <a:xfrm>
-            <a:off x="2758613" y="2794625"/>
-            <a:ext cx="3256908" cy="2442681"/>
+            <a:off x="2628542" y="3092574"/>
+            <a:ext cx="3428143" cy="2571108"/>
           </a:xfrm>
           <a:prstGeom prst="rect">
             <a:avLst/>

</xml_diff>